<commit_message>
updated PowerPoint and project
</commit_message>
<xml_diff>
--- a/Resources/Project1 Name[Group2].pptx
+++ b/Resources/Project1 Name[Group2].pptx
@@ -6227,7 +6227,7 @@
           </a:effectLst>
           <a:extLst>
             <a:ext uri="{91240B29-F687-4f45-9708-019B960494DF}">
-              <a14:hiddenLine xmlns="" xmlns:a14="http://schemas.microsoft.com/office/drawing/2010/main" xmlns:p14="http://schemas.microsoft.com/office/powerpoint/2010/main" xmlns:a16="http://schemas.microsoft.com/office/drawing/2014/main" w="9525">
+              <a14:hiddenLine xmlns:a16="http://schemas.microsoft.com/office/drawing/2014/main" xmlns:p14="http://schemas.microsoft.com/office/powerpoint/2010/main" xmlns:a14="http://schemas.microsoft.com/office/drawing/2010/main" xmlns="" w="9525">
                 <a:solidFill>
                   <a:srgbClr val="000000"/>
                 </a:solidFill>
@@ -6304,15 +6304,20 @@
         </p:spPr>
         <p:txBody>
           <a:bodyPr>
-            <a:normAutofit/>
+            <a:normAutofit fontScale="90000"/>
           </a:bodyPr>
           <a:lstStyle/>
           <a:p>
             <a:pPr algn="l"/>
             <a:r>
               <a:rPr lang="en-US" sz="4000" dirty="0"/>
-              <a:t>Title Project Name</a:t>
-            </a:r>
+              <a:t>The Impact of Behavioral Lifestyles between Gen X and </a:t>
+            </a:r>
+            <a:r>
+              <a:rPr lang="en-US" sz="4000" dirty="0" err="1"/>
+              <a:t>Millenials</a:t>
+            </a:r>
+            <a:endParaRPr lang="en-US" sz="4000" dirty="0"/>
           </a:p>
         </p:txBody>
       </p:sp>
@@ -6436,7 +6441,7 @@
           <a:p>
             <a:r>
               <a:rPr lang="en-US" dirty="0"/>
-              <a:t>Motivation &amp; Summary Slide</a:t>
+              <a:t>Motivation &amp; Summary Slide (Darlene B)</a:t>
             </a:r>
           </a:p>
         </p:txBody>
@@ -6536,7 +6541,7 @@
           <a:p>
             <a:r>
               <a:rPr lang="en-US" dirty="0"/>
-              <a:t>Questions &amp; Data</a:t>
+              <a:t>Questions &amp; Data (Dan)</a:t>
             </a:r>
           </a:p>
         </p:txBody>
@@ -6622,7 +6627,7 @@
           <a:p>
             <a:r>
               <a:rPr lang="en-US" dirty="0"/>
-              <a:t>Data Cleanup &amp; Exploration</a:t>
+              <a:t>Data Cleanup &amp; Exploration (Taylor)</a:t>
             </a:r>
           </a:p>
         </p:txBody>
@@ -6736,7 +6741,7 @@
           <a:p>
             <a:r>
               <a:rPr lang="en-US" dirty="0"/>
-              <a:t>Data Analysis</a:t>
+              <a:t>Data Analysis (all)</a:t>
             </a:r>
           </a:p>
         </p:txBody>
@@ -6838,7 +6843,7 @@
           <a:p>
             <a:r>
               <a:rPr lang="en-US" dirty="0"/>
-              <a:t>Discussion</a:t>
+              <a:t>Discussion (all)</a:t>
             </a:r>
           </a:p>
         </p:txBody>
@@ -6924,7 +6929,7 @@
           <a:p>
             <a:r>
               <a:rPr lang="en-US" dirty="0"/>
-              <a:t>Post Mortem</a:t>
+              <a:t>Post Mortem (Darlene B)</a:t>
             </a:r>
           </a:p>
         </p:txBody>
@@ -6947,13 +6952,40 @@
         </p:nvSpPr>
         <p:spPr/>
         <p:txBody>
-          <a:bodyPr/>
+          <a:bodyPr>
+            <a:normAutofit fontScale="40000" lnSpcReduction="20000"/>
+          </a:bodyPr>
           <a:lstStyle/>
           <a:p>
             <a:r>
               <a:rPr lang="en-US" dirty="0"/>
               <a:t>Discuss any difficulties that arose, and how you dealt with them</a:t>
             </a:r>
+          </a:p>
+          <a:p>
+            <a:r>
+              <a:rPr lang="en-US" b="1" dirty="0" err="1"/>
+              <a:t>ValueError</a:t>
+            </a:r>
+            <a:r>
+              <a:rPr lang="en-US" b="1" dirty="0"/>
+              <a:t>: x and y must have the same length.</a:t>
+            </a:r>
+          </a:p>
+          <a:p>
+            <a:r>
+              <a:rPr lang="en-US" b="1" dirty="0"/>
+              <a:t>Deleting a ‘(‘</a:t>
+            </a:r>
+          </a:p>
+          <a:p>
+            <a:r>
+              <a:rPr lang="en-US" b="1" dirty="0"/>
+              <a:t>Re-running constantly</a:t>
+            </a:r>
+          </a:p>
+          <a:p>
+            <a:endParaRPr lang="en-US" dirty="0"/>
           </a:p>
           <a:p>
             <a:r>
@@ -7245,12 +7277,11 @@
 </file>
 
 <file path=customXml/item1.xml><?xml version="1.0" encoding="utf-8"?>
-<?mso-contentType ?>
-<FormTemplates xmlns="http://schemas.microsoft.com/sharepoint/v3/contenttype/forms">
-  <Display>DocumentLibraryForm</Display>
-  <Edit>DocumentLibraryForm</Edit>
-  <New>DocumentLibraryForm</New>
-</FormTemplates>
+<p:properties xmlns:p="http://schemas.microsoft.com/office/2006/metadata/properties" xmlns:xsi="http://www.w3.org/2001/XMLSchema-instance" xmlns:pc="http://schemas.microsoft.com/office/infopath/2007/PartnerControls">
+  <documentManagement>
+    <MediaServiceKeyPoints xmlns="077ba8de-886e-4701-a0e4-49abe3faf475" xsi:nil="true"/>
+  </documentManagement>
+</p:properties>
 </file>
 
 <file path=customXml/item2.xml><?xml version="1.0" encoding="utf-8"?>
@@ -7477,17 +7508,27 @@
 </file>
 
 <file path=customXml/item3.xml><?xml version="1.0" encoding="utf-8"?>
-<p:properties xmlns:p="http://schemas.microsoft.com/office/2006/metadata/properties" xmlns:xsi="http://www.w3.org/2001/XMLSchema-instance" xmlns:pc="http://schemas.microsoft.com/office/infopath/2007/PartnerControls">
-  <documentManagement>
-    <MediaServiceKeyPoints xmlns="077ba8de-886e-4701-a0e4-49abe3faf475" xsi:nil="true"/>
-  </documentManagement>
-</p:properties>
+<?mso-contentType ?>
+<FormTemplates xmlns="http://schemas.microsoft.com/sharepoint/v3/contenttype/forms">
+  <Display>DocumentLibraryForm</Display>
+  <Edit>DocumentLibraryForm</Edit>
+  <New>DocumentLibraryForm</New>
+</FormTemplates>
 </file>
 
 <file path=customXml/itemProps1.xml><?xml version="1.0" encoding="utf-8"?>
-<ds:datastoreItem xmlns:ds="http://schemas.openxmlformats.org/officeDocument/2006/customXml" ds:itemID="{30CB38EC-895A-4F8F-8F75-E263501ABB5A}">
+<ds:datastoreItem xmlns:ds="http://schemas.openxmlformats.org/officeDocument/2006/customXml" ds:itemID="{F7E70FC5-1855-47AB-8CE1-CB3C873A8988}">
   <ds:schemaRefs>
-    <ds:schemaRef ds:uri="http://schemas.microsoft.com/sharepoint/v3/contenttype/forms"/>
+    <ds:schemaRef ds:uri="d089999e-d689-414c-b886-05d2fa5e20b3"/>
+    <ds:schemaRef ds:uri="http://schemas.microsoft.com/office/2006/documentManagement/types"/>
+    <ds:schemaRef ds:uri="http://purl.org/dc/elements/1.1/"/>
+    <ds:schemaRef ds:uri="http://schemas.openxmlformats.org/package/2006/metadata/core-properties"/>
+    <ds:schemaRef ds:uri="http://purl.org/dc/terms/"/>
+    <ds:schemaRef ds:uri="http://purl.org/dc/dcmitype/"/>
+    <ds:schemaRef ds:uri="077ba8de-886e-4701-a0e4-49abe3faf475"/>
+    <ds:schemaRef ds:uri="http://schemas.microsoft.com/office/infopath/2007/PartnerControls"/>
+    <ds:schemaRef ds:uri="http://schemas.microsoft.com/office/2006/metadata/properties"/>
+    <ds:schemaRef ds:uri="http://www.w3.org/XML/1998/namespace"/>
   </ds:schemaRefs>
 </ds:datastoreItem>
 </file>
@@ -7512,18 +7553,9 @@
 </file>
 
 <file path=customXml/itemProps3.xml><?xml version="1.0" encoding="utf-8"?>
-<ds:datastoreItem xmlns:ds="http://schemas.openxmlformats.org/officeDocument/2006/customXml" ds:itemID="{F7E70FC5-1855-47AB-8CE1-CB3C873A8988}">
+<ds:datastoreItem xmlns:ds="http://schemas.openxmlformats.org/officeDocument/2006/customXml" ds:itemID="{30CB38EC-895A-4F8F-8F75-E263501ABB5A}">
   <ds:schemaRefs>
-    <ds:schemaRef ds:uri="d089999e-d689-414c-b886-05d2fa5e20b3"/>
-    <ds:schemaRef ds:uri="http://schemas.microsoft.com/office/2006/documentManagement/types"/>
-    <ds:schemaRef ds:uri="http://purl.org/dc/elements/1.1/"/>
-    <ds:schemaRef ds:uri="http://schemas.openxmlformats.org/package/2006/metadata/core-properties"/>
-    <ds:schemaRef ds:uri="http://purl.org/dc/terms/"/>
-    <ds:schemaRef ds:uri="http://purl.org/dc/dcmitype/"/>
-    <ds:schemaRef ds:uri="077ba8de-886e-4701-a0e4-49abe3faf475"/>
-    <ds:schemaRef ds:uri="http://schemas.microsoft.com/office/infopath/2007/PartnerControls"/>
-    <ds:schemaRef ds:uri="http://schemas.microsoft.com/office/2006/metadata/properties"/>
-    <ds:schemaRef ds:uri="http://www.w3.org/XML/1998/namespace"/>
+    <ds:schemaRef ds:uri="http://schemas.microsoft.com/sharepoint/v3/contenttype/forms"/>
   </ds:schemaRefs>
 </ds:datastoreItem>
 </file>
</xml_diff>